<commit_message>
add indices, build graph
</commit_message>
<xml_diff>
--- a/Finding Anagrams v3.0.pptx
+++ b/Finding Anagrams v3.0.pptx
@@ -5,7 +5,7 @@
     <p:sldMasterId id="2147483672" r:id="rId1"/>
   </p:sldMasterIdLst>
   <p:notesMasterIdLst>
-    <p:notesMasterId r:id="rId40"/>
+    <p:notesMasterId r:id="rId42"/>
   </p:notesMasterIdLst>
   <p:sldIdLst>
     <p:sldId id="256" r:id="rId2"/>
@@ -46,6 +46,8 @@
     <p:sldId id="290" r:id="rId37"/>
     <p:sldId id="291" r:id="rId38"/>
     <p:sldId id="306" r:id="rId39"/>
+    <p:sldId id="307" r:id="rId40"/>
+    <p:sldId id="308" r:id="rId41"/>
   </p:sldIdLst>
   <p:sldSz cx="12192000" cy="6858000"/>
   <p:notesSz cx="6858000" cy="9144000"/>
@@ -234,7 +236,7 @@
           <a:p>
             <a:fld id="{7D2B9B78-C072-4694-8A2D-FFBA9FE94E5B}" type="datetimeFigureOut">
               <a:rPr lang="en-US" smtClean="0"/>
-              <a:t>8/11/2023</a:t>
+              <a:t>7/12/2024</a:t>
             </a:fld>
             <a:endParaRPr lang="en-US" dirty="0"/>
           </a:p>
@@ -1836,7 +1838,7 @@
           <a:p>
             <a:fld id="{271D0E5B-1AAA-41B9-A681-2CC64CA97BA3}" type="datetimeFigureOut">
               <a:rPr lang="en-US" smtClean="0"/>
-              <a:t>8/11/2023</a:t>
+              <a:t>7/12/2024</a:t>
             </a:fld>
             <a:endParaRPr lang="en-US" dirty="0"/>
           </a:p>
@@ -2034,7 +2036,7 @@
           <a:p>
             <a:fld id="{271D0E5B-1AAA-41B9-A681-2CC64CA97BA3}" type="datetimeFigureOut">
               <a:rPr lang="en-US" smtClean="0"/>
-              <a:t>8/11/2023</a:t>
+              <a:t>7/12/2024</a:t>
             </a:fld>
             <a:endParaRPr lang="en-US" dirty="0"/>
           </a:p>
@@ -2242,7 +2244,7 @@
           <a:p>
             <a:fld id="{271D0E5B-1AAA-41B9-A681-2CC64CA97BA3}" type="datetimeFigureOut">
               <a:rPr lang="en-US" smtClean="0"/>
-              <a:t>8/11/2023</a:t>
+              <a:t>7/12/2024</a:t>
             </a:fld>
             <a:endParaRPr lang="en-US" dirty="0"/>
           </a:p>
@@ -2440,7 +2442,7 @@
           <a:p>
             <a:fld id="{271D0E5B-1AAA-41B9-A681-2CC64CA97BA3}" type="datetimeFigureOut">
               <a:rPr lang="en-US" smtClean="0"/>
-              <a:t>8/11/2023</a:t>
+              <a:t>7/12/2024</a:t>
             </a:fld>
             <a:endParaRPr lang="en-US" dirty="0"/>
           </a:p>
@@ -2715,7 +2717,7 @@
           <a:p>
             <a:fld id="{271D0E5B-1AAA-41B9-A681-2CC64CA97BA3}" type="datetimeFigureOut">
               <a:rPr lang="en-US" smtClean="0"/>
-              <a:t>8/11/2023</a:t>
+              <a:t>7/12/2024</a:t>
             </a:fld>
             <a:endParaRPr lang="en-US" dirty="0"/>
           </a:p>
@@ -2980,7 +2982,7 @@
           <a:p>
             <a:fld id="{271D0E5B-1AAA-41B9-A681-2CC64CA97BA3}" type="datetimeFigureOut">
               <a:rPr lang="en-US" smtClean="0"/>
-              <a:t>8/11/2023</a:t>
+              <a:t>7/12/2024</a:t>
             </a:fld>
             <a:endParaRPr lang="en-US" dirty="0"/>
           </a:p>
@@ -3392,7 +3394,7 @@
           <a:p>
             <a:fld id="{271D0E5B-1AAA-41B9-A681-2CC64CA97BA3}" type="datetimeFigureOut">
               <a:rPr lang="en-US" smtClean="0"/>
-              <a:t>8/11/2023</a:t>
+              <a:t>7/12/2024</a:t>
             </a:fld>
             <a:endParaRPr lang="en-US" dirty="0"/>
           </a:p>
@@ -3533,7 +3535,7 @@
           <a:p>
             <a:fld id="{271D0E5B-1AAA-41B9-A681-2CC64CA97BA3}" type="datetimeFigureOut">
               <a:rPr lang="en-US" smtClean="0"/>
-              <a:t>8/11/2023</a:t>
+              <a:t>7/12/2024</a:t>
             </a:fld>
             <a:endParaRPr lang="en-US" dirty="0"/>
           </a:p>
@@ -3646,7 +3648,7 @@
           <a:p>
             <a:fld id="{271D0E5B-1AAA-41B9-A681-2CC64CA97BA3}" type="datetimeFigureOut">
               <a:rPr lang="en-US" smtClean="0"/>
-              <a:t>8/11/2023</a:t>
+              <a:t>7/12/2024</a:t>
             </a:fld>
             <a:endParaRPr lang="en-US" dirty="0"/>
           </a:p>
@@ -3957,7 +3959,7 @@
           <a:p>
             <a:fld id="{271D0E5B-1AAA-41B9-A681-2CC64CA97BA3}" type="datetimeFigureOut">
               <a:rPr lang="en-US" smtClean="0"/>
-              <a:t>8/11/2023</a:t>
+              <a:t>7/12/2024</a:t>
             </a:fld>
             <a:endParaRPr lang="en-US" dirty="0"/>
           </a:p>
@@ -4245,7 +4247,7 @@
           <a:p>
             <a:fld id="{271D0E5B-1AAA-41B9-A681-2CC64CA97BA3}" type="datetimeFigureOut">
               <a:rPr lang="en-US" smtClean="0"/>
-              <a:t>8/11/2023</a:t>
+              <a:t>7/12/2024</a:t>
             </a:fld>
             <a:endParaRPr lang="en-US" dirty="0"/>
           </a:p>
@@ -4486,7 +4488,7 @@
           <a:p>
             <a:fld id="{271D0E5B-1AAA-41B9-A681-2CC64CA97BA3}" type="datetimeFigureOut">
               <a:rPr lang="en-US" smtClean="0"/>
-              <a:t>8/11/2023</a:t>
+              <a:t>7/12/2024</a:t>
             </a:fld>
             <a:endParaRPr lang="en-US" dirty="0"/>
           </a:p>
@@ -5065,7 +5067,7 @@
         </p:spPr>
         <p:txBody>
           <a:bodyPr>
-            <a:normAutofit fontScale="85000" lnSpcReduction="10000"/>
+            <a:normAutofit fontScale="85000" lnSpcReduction="20000"/>
           </a:bodyPr>
           <a:lstStyle/>
           <a:p>
@@ -5095,13 +5097,13 @@
           <a:p>
             <a:r>
               <a:rPr lang="en-US" dirty="0"/>
-              <a:t>Values &gt;= 0 indicate that the focal word ‘rite’ is nested in the ‘candidates’ matrix</a:t>
-            </a:r>
-          </a:p>
-          <a:p>
-            <a:r>
-              <a:rPr lang="en-US" dirty="0"/>
-              <a:t>Values &lt; 0 indicate that the focal word ‘rite’ is not nested in the ‘candidates’ matrix</a:t>
+              <a:t>Values &gt;= 0 indicate that the focal word ‘rite’ can be found in a row in the ‘candidates’ matrix</a:t>
+            </a:r>
+          </a:p>
+          <a:p>
+            <a:r>
+              <a:rPr lang="en-US" dirty="0"/>
+              <a:t>Values &lt; 0 indicate that the focal word ‘rite’ can not found in the ‘candidates’ matrix</a:t>
             </a:r>
           </a:p>
           <a:p>
@@ -5137,7 +5139,7 @@
         </p:blipFill>
         <p:spPr>
           <a:xfrm>
-            <a:off x="5181472" y="2876950"/>
+            <a:off x="5181472" y="2588194"/>
             <a:ext cx="1829055" cy="1648055"/>
           </a:xfrm>
           <a:prstGeom prst="rect">
@@ -8635,7 +8637,9 @@
         </p:nvSpPr>
         <p:spPr/>
         <p:txBody>
-          <a:bodyPr/>
+          <a:bodyPr>
+            <a:normAutofit/>
+          </a:bodyPr>
           <a:lstStyle/>
           <a:p>
             <a:r>
@@ -8711,6 +8715,89 @@
     <p:extLst>
       <p:ext uri="{BB962C8B-B14F-4D97-AF65-F5344CB8AC3E}">
         <p14:creationId xmlns:p14="http://schemas.microsoft.com/office/powerpoint/2010/main" val="3106940610"/>
+      </p:ext>
+    </p:extLst>
+  </p:cSld>
+  <p:clrMapOvr>
+    <a:masterClrMapping/>
+  </p:clrMapOvr>
+</p:sld>
+</file>
+
+<file path=ppt/slides/slide39.xml><?xml version="1.0" encoding="utf-8"?>
+<p:sld xmlns:a="http://schemas.openxmlformats.org/drawingml/2006/main" xmlns:r="http://schemas.openxmlformats.org/officeDocument/2006/relationships" xmlns:p="http://schemas.openxmlformats.org/presentationml/2006/main">
+  <p:cSld>
+    <p:spTree>
+      <p:nvGrpSpPr>
+        <p:cNvPr id="1" name=""/>
+        <p:cNvGrpSpPr/>
+        <p:nvPr/>
+      </p:nvGrpSpPr>
+      <p:grpSpPr>
+        <a:xfrm>
+          <a:off x="0" y="0"/>
+          <a:ext cx="0" cy="0"/>
+          <a:chOff x="0" y="0"/>
+          <a:chExt cx="0" cy="0"/>
+        </a:xfrm>
+      </p:grpSpPr>
+      <p:sp>
+        <p:nvSpPr>
+          <p:cNvPr id="2" name="Title 1">
+            <a:extLst>
+              <a:ext uri="{FF2B5EF4-FFF2-40B4-BE49-F238E27FC236}">
+                <a16:creationId xmlns:a16="http://schemas.microsoft.com/office/drawing/2014/main" id="{30AF2478-F6BA-808C-7F37-B70EA722F385}"/>
+              </a:ext>
+            </a:extLst>
+          </p:cNvPr>
+          <p:cNvSpPr>
+            <a:spLocks noGrp="1"/>
+          </p:cNvSpPr>
+          <p:nvPr>
+            <p:ph type="title"/>
+          </p:nvPr>
+        </p:nvSpPr>
+        <p:spPr/>
+        <p:txBody>
+          <a:bodyPr/>
+          <a:lstStyle/>
+          <a:p>
+            <a:r>
+              <a:rPr lang="en-US" dirty="0"/>
+              <a:t>Placeholders</a:t>
+            </a:r>
+          </a:p>
+        </p:txBody>
+      </p:sp>
+      <p:sp>
+        <p:nvSpPr>
+          <p:cNvPr id="3" name="Text Placeholder 2">
+            <a:extLst>
+              <a:ext uri="{FF2B5EF4-FFF2-40B4-BE49-F238E27FC236}">
+                <a16:creationId xmlns:a16="http://schemas.microsoft.com/office/drawing/2014/main" id="{7EAEF581-3994-425D-5910-24775BA8AA49}"/>
+              </a:ext>
+            </a:extLst>
+          </p:cNvPr>
+          <p:cNvSpPr>
+            <a:spLocks noGrp="1"/>
+          </p:cNvSpPr>
+          <p:nvPr>
+            <p:ph type="body" idx="1"/>
+          </p:nvPr>
+        </p:nvSpPr>
+        <p:spPr/>
+        <p:txBody>
+          <a:bodyPr/>
+          <a:lstStyle/>
+          <a:p>
+            <a:endParaRPr lang="en-US"/>
+          </a:p>
+        </p:txBody>
+      </p:sp>
+    </p:spTree>
+    <p:extLst>
+      <p:ext uri="{BB962C8B-B14F-4D97-AF65-F5344CB8AC3E}">
+        <p14:creationId xmlns:p14="http://schemas.microsoft.com/office/powerpoint/2010/main" val="3053440877"/>
       </p:ext>
     </p:extLst>
   </p:cSld>
@@ -8829,7 +8916,7 @@
             </a:pPr>
             <a:r>
               <a:rPr lang="en-US" dirty="0"/>
-              <a:t>We can describe the word ‘terminator’ as a from/parent word of ‘time’-’item’-’emit’-’mite’ to/child words. </a:t>
+              <a:t>We can describe the word ‘terminator’ as a from/parent word of ‘time’-and ‘item’-’emit’-’mite’ to/child words. </a:t>
             </a:r>
           </a:p>
           <a:p>
@@ -8856,6 +8943,120 @@
     <p:extLst>
       <p:ext uri="{BB962C8B-B14F-4D97-AF65-F5344CB8AC3E}">
         <p14:creationId xmlns:p14="http://schemas.microsoft.com/office/powerpoint/2010/main" val="578106251"/>
+      </p:ext>
+    </p:extLst>
+  </p:cSld>
+  <p:clrMapOvr>
+    <a:masterClrMapping/>
+  </p:clrMapOvr>
+</p:sld>
+</file>
+
+<file path=ppt/slides/slide40.xml><?xml version="1.0" encoding="utf-8"?>
+<p:sld xmlns:a="http://schemas.openxmlformats.org/drawingml/2006/main" xmlns:r="http://schemas.openxmlformats.org/officeDocument/2006/relationships" xmlns:p="http://schemas.openxmlformats.org/presentationml/2006/main">
+  <p:cSld>
+    <p:spTree>
+      <p:nvGrpSpPr>
+        <p:cNvPr id="1" name=""/>
+        <p:cNvGrpSpPr/>
+        <p:nvPr/>
+      </p:nvGrpSpPr>
+      <p:grpSpPr>
+        <a:xfrm>
+          <a:off x="0" y="0"/>
+          <a:ext cx="0" cy="0"/>
+          <a:chOff x="0" y="0"/>
+          <a:chExt cx="0" cy="0"/>
+        </a:xfrm>
+      </p:grpSpPr>
+      <p:sp>
+        <p:nvSpPr>
+          <p:cNvPr id="4" name="Title 3">
+            <a:extLst>
+              <a:ext uri="{FF2B5EF4-FFF2-40B4-BE49-F238E27FC236}">
+                <a16:creationId xmlns:a16="http://schemas.microsoft.com/office/drawing/2014/main" id="{BF90BA42-EC5E-6CB8-F91A-4721DD4F5582}"/>
+              </a:ext>
+            </a:extLst>
+          </p:cNvPr>
+          <p:cNvSpPr>
+            <a:spLocks noGrp="1"/>
+          </p:cNvSpPr>
+          <p:nvPr>
+            <p:ph type="title"/>
+          </p:nvPr>
+        </p:nvSpPr>
+        <p:spPr/>
+        <p:txBody>
+          <a:bodyPr/>
+          <a:lstStyle/>
+          <a:p>
+            <a:endParaRPr lang="en-US"/>
+          </a:p>
+        </p:txBody>
+      </p:sp>
+      <p:pic>
+        <p:nvPicPr>
+          <p:cNvPr id="7" name="Content Placeholder 6">
+            <a:extLst>
+              <a:ext uri="{FF2B5EF4-FFF2-40B4-BE49-F238E27FC236}">
+                <a16:creationId xmlns:a16="http://schemas.microsoft.com/office/drawing/2014/main" id="{B4846270-C6D8-5E37-722E-F4F1FEC597EA}"/>
+              </a:ext>
+            </a:extLst>
+          </p:cNvPr>
+          <p:cNvPicPr>
+            <a:picLocks noGrp="1" noChangeAspect="1"/>
+          </p:cNvPicPr>
+          <p:nvPr>
+            <p:ph idx="1"/>
+          </p:nvPr>
+        </p:nvPicPr>
+        <p:blipFill>
+          <a:blip r:embed="rId2"/>
+          <a:stretch>
+            <a:fillRect/>
+          </a:stretch>
+        </p:blipFill>
+        <p:spPr>
+          <a:xfrm>
+            <a:off x="682430" y="1690688"/>
+            <a:ext cx="8773749" cy="2600688"/>
+          </a:xfrm>
+        </p:spPr>
+      </p:pic>
+      <p:pic>
+        <p:nvPicPr>
+          <p:cNvPr id="9" name="Picture 8">
+            <a:extLst>
+              <a:ext uri="{FF2B5EF4-FFF2-40B4-BE49-F238E27FC236}">
+                <a16:creationId xmlns:a16="http://schemas.microsoft.com/office/drawing/2014/main" id="{D773A9C7-DFC8-0CC4-DF5E-8A090E2F9233}"/>
+              </a:ext>
+            </a:extLst>
+          </p:cNvPr>
+          <p:cNvPicPr>
+            <a:picLocks noChangeAspect="1"/>
+          </p:cNvPicPr>
+          <p:nvPr/>
+        </p:nvPicPr>
+        <p:blipFill>
+          <a:blip r:embed="rId3"/>
+          <a:stretch>
+            <a:fillRect/>
+          </a:stretch>
+        </p:blipFill>
+        <p:spPr>
+          <a:xfrm>
+            <a:off x="3445715" y="4238259"/>
+            <a:ext cx="8316486" cy="2619741"/>
+          </a:xfrm>
+          <a:prstGeom prst="rect">
+            <a:avLst/>
+          </a:prstGeom>
+        </p:spPr>
+      </p:pic>
+    </p:spTree>
+    <p:extLst>
+      <p:ext uri="{BB962C8B-B14F-4D97-AF65-F5344CB8AC3E}">
+        <p14:creationId xmlns:p14="http://schemas.microsoft.com/office/powerpoint/2010/main" val="968444199"/>
       </p:ext>
     </p:extLst>
   </p:cSld>

</xml_diff>